<commit_message>
Another minor update to the lab slides
</commit_message>
<xml_diff>
--- a/lab5/lecture/lab5.pptx
+++ b/lab5/lecture/lab5.pptx
@@ -5842,6 +5842,13 @@
                 </a:r>
               </a:p>
               <a:p>
+                <a:pPr lvl="1"/>
+                <a:r>
+                  <a:rPr lang="en-US" dirty="0"/>
+                  <a:t>int arr5[10] = {[0] = 1, [4] = 5, [9] = 10}; // Valid only in C99</a:t>
+                </a:r>
+              </a:p>
+              <a:p>
                 <a:r>
                   <a:rPr lang="en-US" dirty="0"/>
                   <a:t>Initialization: </a:t>
@@ -6210,7 +6217,7 @@
               <a:blipFill>
                 <a:blip r:embed="rId2"/>
                 <a:stretch>
-                  <a:fillRect l="-545" t="-1970"/>
+                  <a:fillRect l="-545" t="-1970" b="-455"/>
                 </a:stretch>
               </a:blipFill>
             </p:spPr>
@@ -6603,59 +6610,14 @@
                             </p:stCondLst>
                             <p:childTnLst>
                               <p:par>
-                                <p:cTn id="33" presetID="3" presetClass="emph" presetSubtype="2" fill="hold" nodeType="clickEffect">
-                                  <p:stCondLst>
-                                    <p:cond delay="0"/>
-                                  </p:stCondLst>
-                                  <p:childTnLst>
-                                    <p:animClr clrSpc="rgb" dir="cw">
-                                      <p:cBhvr override="childStyle">
-                                        <p:cTn id="34" dur="100" fill="hold"/>
-                                        <p:tgtEl>
-                                          <p:spTgt spid="3">
-                                            <p:txEl>
-                                              <p:pRg st="7" end="7"/>
-                                            </p:txEl>
-                                          </p:spTgt>
-                                        </p:tgtEl>
-                                        <p:attrNameLst>
-                                          <p:attrName>style.color</p:attrName>
-                                        </p:attrNameLst>
-                                      </p:cBhvr>
-                                      <p:to>
-                                        <a:srgbClr val="00B050"/>
-                                      </p:to>
-                                    </p:animClr>
-                                  </p:childTnLst>
-                                </p:cTn>
-                              </p:par>
-                            </p:childTnLst>
-                          </p:cTn>
-                        </p:par>
-                      </p:childTnLst>
-                    </p:cTn>
-                  </p:par>
-                  <p:par>
-                    <p:cTn id="35" fill="hold">
-                      <p:stCondLst>
-                        <p:cond delay="indefinite"/>
-                      </p:stCondLst>
-                      <p:childTnLst>
-                        <p:par>
-                          <p:cTn id="36" fill="hold">
-                            <p:stCondLst>
-                              <p:cond delay="0"/>
-                            </p:stCondLst>
-                            <p:childTnLst>
-                              <p:par>
-                                <p:cTn id="37" presetID="1" presetClass="entr" presetSubtype="0" fill="hold" nodeType="clickEffect">
+                                <p:cTn id="33" presetID="1" presetClass="entr" presetSubtype="0" fill="hold" nodeType="clickEffect">
                                   <p:stCondLst>
                                     <p:cond delay="0"/>
                                   </p:stCondLst>
                                   <p:childTnLst>
                                     <p:set>
                                       <p:cBhvr>
-                                        <p:cTn id="38" dur="1" fill="hold">
+                                        <p:cTn id="34" dur="1" fill="hold">
                                           <p:stCondLst>
                                             <p:cond delay="0"/>
                                           </p:stCondLst>
@@ -6685,6 +6647,51 @@
                     </p:cTn>
                   </p:par>
                   <p:par>
+                    <p:cTn id="35" fill="hold">
+                      <p:stCondLst>
+                        <p:cond delay="indefinite"/>
+                      </p:stCondLst>
+                      <p:childTnLst>
+                        <p:par>
+                          <p:cTn id="36" fill="hold">
+                            <p:stCondLst>
+                              <p:cond delay="0"/>
+                            </p:stCondLst>
+                            <p:childTnLst>
+                              <p:par>
+                                <p:cTn id="37" presetID="3" presetClass="emph" presetSubtype="2" fill="hold" nodeType="clickEffect">
+                                  <p:stCondLst>
+                                    <p:cond delay="0"/>
+                                  </p:stCondLst>
+                                  <p:childTnLst>
+                                    <p:animClr clrSpc="rgb" dir="cw">
+                                      <p:cBhvr override="childStyle">
+                                        <p:cTn id="38" dur="100" fill="hold"/>
+                                        <p:tgtEl>
+                                          <p:spTgt spid="3">
+                                            <p:txEl>
+                                              <p:pRg st="8" end="8"/>
+                                            </p:txEl>
+                                          </p:spTgt>
+                                        </p:tgtEl>
+                                        <p:attrNameLst>
+                                          <p:attrName>style.color</p:attrName>
+                                        </p:attrNameLst>
+                                      </p:cBhvr>
+                                      <p:to>
+                                        <a:srgbClr val="00B050"/>
+                                      </p:to>
+                                    </p:animClr>
+                                  </p:childTnLst>
+                                </p:cTn>
+                              </p:par>
+                            </p:childTnLst>
+                          </p:cTn>
+                        </p:par>
+                      </p:childTnLst>
+                    </p:cTn>
+                  </p:par>
+                  <p:par>
                     <p:cTn id="39" fill="hold">
                       <p:stCondLst>
                         <p:cond delay="indefinite"/>
@@ -6697,59 +6704,14 @@
                             </p:stCondLst>
                             <p:childTnLst>
                               <p:par>
-                                <p:cTn id="41" presetID="3" presetClass="emph" presetSubtype="2" fill="hold" nodeType="clickEffect">
-                                  <p:stCondLst>
-                                    <p:cond delay="0"/>
-                                  </p:stCondLst>
-                                  <p:childTnLst>
-                                    <p:animClr clrSpc="rgb" dir="cw">
-                                      <p:cBhvr override="childStyle">
-                                        <p:cTn id="42" dur="100" fill="hold"/>
-                                        <p:tgtEl>
-                                          <p:spTgt spid="3">
-                                            <p:txEl>
-                                              <p:pRg st="8" end="8"/>
-                                            </p:txEl>
-                                          </p:spTgt>
-                                        </p:tgtEl>
-                                        <p:attrNameLst>
-                                          <p:attrName>style.color</p:attrName>
-                                        </p:attrNameLst>
-                                      </p:cBhvr>
-                                      <p:to>
-                                        <a:srgbClr val="FF0000"/>
-                                      </p:to>
-                                    </p:animClr>
-                                  </p:childTnLst>
-                                </p:cTn>
-                              </p:par>
-                            </p:childTnLst>
-                          </p:cTn>
-                        </p:par>
-                      </p:childTnLst>
-                    </p:cTn>
-                  </p:par>
-                  <p:par>
-                    <p:cTn id="43" fill="hold">
-                      <p:stCondLst>
-                        <p:cond delay="indefinite"/>
-                      </p:stCondLst>
-                      <p:childTnLst>
-                        <p:par>
-                          <p:cTn id="44" fill="hold">
-                            <p:stCondLst>
-                              <p:cond delay="0"/>
-                            </p:stCondLst>
-                            <p:childTnLst>
-                              <p:par>
-                                <p:cTn id="45" presetID="1" presetClass="entr" presetSubtype="0" fill="hold" nodeType="clickEffect">
+                                <p:cTn id="41" presetID="1" presetClass="entr" presetSubtype="0" fill="hold" nodeType="clickEffect">
                                   <p:stCondLst>
                                     <p:cond delay="0"/>
                                   </p:stCondLst>
                                   <p:childTnLst>
                                     <p:set>
                                       <p:cBhvr>
-                                        <p:cTn id="46" dur="1" fill="hold">
+                                        <p:cTn id="42" dur="1" fill="hold">
                                           <p:stCondLst>
                                             <p:cond delay="0"/>
                                           </p:stCondLst>
@@ -6779,26 +6741,26 @@
                     </p:cTn>
                   </p:par>
                   <p:par>
-                    <p:cTn id="47" fill="hold">
+                    <p:cTn id="43" fill="hold">
                       <p:stCondLst>
                         <p:cond delay="indefinite"/>
                       </p:stCondLst>
                       <p:childTnLst>
                         <p:par>
-                          <p:cTn id="48" fill="hold">
+                          <p:cTn id="44" fill="hold">
                             <p:stCondLst>
                               <p:cond delay="0"/>
                             </p:stCondLst>
                             <p:childTnLst>
                               <p:par>
-                                <p:cTn id="49" presetID="3" presetClass="emph" presetSubtype="2" fill="hold" nodeType="clickEffect">
+                                <p:cTn id="45" presetID="3" presetClass="emph" presetSubtype="2" fill="hold" nodeType="clickEffect">
                                   <p:stCondLst>
                                     <p:cond delay="0"/>
                                   </p:stCondLst>
                                   <p:childTnLst>
                                     <p:animClr clrSpc="rgb" dir="cw">
                                       <p:cBhvr override="childStyle">
-                                        <p:cTn id="50" dur="100" fill="hold"/>
+                                        <p:cTn id="46" dur="100" fill="hold"/>
                                         <p:tgtEl>
                                           <p:spTgt spid="3">
                                             <p:txEl>
@@ -6824,26 +6786,26 @@
                     </p:cTn>
                   </p:par>
                   <p:par>
-                    <p:cTn id="51" fill="hold">
+                    <p:cTn id="47" fill="hold">
                       <p:stCondLst>
                         <p:cond delay="indefinite"/>
                       </p:stCondLst>
                       <p:childTnLst>
                         <p:par>
-                          <p:cTn id="52" fill="hold">
+                          <p:cTn id="48" fill="hold">
                             <p:stCondLst>
                               <p:cond delay="0"/>
                             </p:stCondLst>
                             <p:childTnLst>
                               <p:par>
-                                <p:cTn id="53" presetID="1" presetClass="entr" presetSubtype="0" fill="hold" nodeType="clickEffect">
+                                <p:cTn id="49" presetID="1" presetClass="entr" presetSubtype="0" fill="hold" nodeType="clickEffect">
                                   <p:stCondLst>
                                     <p:cond delay="0"/>
                                   </p:stCondLst>
                                   <p:childTnLst>
                                     <p:set>
                                       <p:cBhvr>
-                                        <p:cTn id="54" dur="1" fill="hold">
+                                        <p:cTn id="50" dur="1" fill="hold">
                                           <p:stCondLst>
                                             <p:cond delay="0"/>
                                           </p:stCondLst>
@@ -6873,6 +6835,51 @@
                     </p:cTn>
                   </p:par>
                   <p:par>
+                    <p:cTn id="51" fill="hold">
+                      <p:stCondLst>
+                        <p:cond delay="indefinite"/>
+                      </p:stCondLst>
+                      <p:childTnLst>
+                        <p:par>
+                          <p:cTn id="52" fill="hold">
+                            <p:stCondLst>
+                              <p:cond delay="0"/>
+                            </p:stCondLst>
+                            <p:childTnLst>
+                              <p:par>
+                                <p:cTn id="53" presetID="3" presetClass="emph" presetSubtype="2" fill="hold" nodeType="clickEffect">
+                                  <p:stCondLst>
+                                    <p:cond delay="0"/>
+                                  </p:stCondLst>
+                                  <p:childTnLst>
+                                    <p:animClr clrSpc="rgb" dir="cw">
+                                      <p:cBhvr override="childStyle">
+                                        <p:cTn id="54" dur="100" fill="hold"/>
+                                        <p:tgtEl>
+                                          <p:spTgt spid="3">
+                                            <p:txEl>
+                                              <p:pRg st="10" end="10"/>
+                                            </p:txEl>
+                                          </p:spTgt>
+                                        </p:tgtEl>
+                                        <p:attrNameLst>
+                                          <p:attrName>style.color</p:attrName>
+                                        </p:attrNameLst>
+                                      </p:cBhvr>
+                                      <p:to>
+                                        <a:srgbClr val="FF0000"/>
+                                      </p:to>
+                                    </p:animClr>
+                                  </p:childTnLst>
+                                </p:cTn>
+                              </p:par>
+                            </p:childTnLst>
+                          </p:cTn>
+                        </p:par>
+                      </p:childTnLst>
+                    </p:cTn>
+                  </p:par>
+                  <p:par>
                     <p:cTn id="55" fill="hold">
                       <p:stCondLst>
                         <p:cond delay="indefinite"/>
@@ -6885,59 +6892,14 @@
                             </p:stCondLst>
                             <p:childTnLst>
                               <p:par>
-                                <p:cTn id="57" presetID="3" presetClass="emph" presetSubtype="2" fill="hold" nodeType="clickEffect">
-                                  <p:stCondLst>
-                                    <p:cond delay="0"/>
-                                  </p:stCondLst>
-                                  <p:childTnLst>
-                                    <p:animClr clrSpc="rgb" dir="cw">
-                                      <p:cBhvr override="childStyle">
-                                        <p:cTn id="58" dur="100" fill="hold"/>
-                                        <p:tgtEl>
-                                          <p:spTgt spid="3">
-                                            <p:txEl>
-                                              <p:pRg st="10" end="10"/>
-                                            </p:txEl>
-                                          </p:spTgt>
-                                        </p:tgtEl>
-                                        <p:attrNameLst>
-                                          <p:attrName>style.color</p:attrName>
-                                        </p:attrNameLst>
-                                      </p:cBhvr>
-                                      <p:to>
-                                        <a:srgbClr val="00B050"/>
-                                      </p:to>
-                                    </p:animClr>
-                                  </p:childTnLst>
-                                </p:cTn>
-                              </p:par>
-                            </p:childTnLst>
-                          </p:cTn>
-                        </p:par>
-                      </p:childTnLst>
-                    </p:cTn>
-                  </p:par>
-                  <p:par>
-                    <p:cTn id="59" fill="hold">
-                      <p:stCondLst>
-                        <p:cond delay="indefinite"/>
-                      </p:stCondLst>
-                      <p:childTnLst>
-                        <p:par>
-                          <p:cTn id="60" fill="hold">
-                            <p:stCondLst>
-                              <p:cond delay="0"/>
-                            </p:stCondLst>
-                            <p:childTnLst>
-                              <p:par>
-                                <p:cTn id="61" presetID="1" presetClass="entr" presetSubtype="0" fill="hold" nodeType="clickEffect">
+                                <p:cTn id="57" presetID="1" presetClass="entr" presetSubtype="0" fill="hold" nodeType="clickEffect">
                                   <p:stCondLst>
                                     <p:cond delay="0"/>
                                   </p:stCondLst>
                                   <p:childTnLst>
                                     <p:set>
                                       <p:cBhvr>
-                                        <p:cTn id="62" dur="1" fill="hold">
+                                        <p:cTn id="58" dur="1" fill="hold">
                                           <p:stCondLst>
                                             <p:cond delay="0"/>
                                           </p:stCondLst>
@@ -6967,6 +6929,51 @@
                     </p:cTn>
                   </p:par>
                   <p:par>
+                    <p:cTn id="59" fill="hold">
+                      <p:stCondLst>
+                        <p:cond delay="indefinite"/>
+                      </p:stCondLst>
+                      <p:childTnLst>
+                        <p:par>
+                          <p:cTn id="60" fill="hold">
+                            <p:stCondLst>
+                              <p:cond delay="0"/>
+                            </p:stCondLst>
+                            <p:childTnLst>
+                              <p:par>
+                                <p:cTn id="61" presetID="3" presetClass="emph" presetSubtype="2" fill="hold" nodeType="clickEffect">
+                                  <p:stCondLst>
+                                    <p:cond delay="0"/>
+                                  </p:stCondLst>
+                                  <p:childTnLst>
+                                    <p:animClr clrSpc="rgb" dir="cw">
+                                      <p:cBhvr override="childStyle">
+                                        <p:cTn id="62" dur="100" fill="hold"/>
+                                        <p:tgtEl>
+                                          <p:spTgt spid="3">
+                                            <p:txEl>
+                                              <p:pRg st="11" end="11"/>
+                                            </p:txEl>
+                                          </p:spTgt>
+                                        </p:tgtEl>
+                                        <p:attrNameLst>
+                                          <p:attrName>style.color</p:attrName>
+                                        </p:attrNameLst>
+                                      </p:cBhvr>
+                                      <p:to>
+                                        <a:srgbClr val="00B050"/>
+                                      </p:to>
+                                    </p:animClr>
+                                  </p:childTnLst>
+                                </p:cTn>
+                              </p:par>
+                            </p:childTnLst>
+                          </p:cTn>
+                        </p:par>
+                      </p:childTnLst>
+                    </p:cTn>
+                  </p:par>
+                  <p:par>
                     <p:cTn id="63" fill="hold">
                       <p:stCondLst>
                         <p:cond delay="indefinite"/>
@@ -6979,18 +6986,67 @@
                             </p:stCondLst>
                             <p:childTnLst>
                               <p:par>
-                                <p:cTn id="65" presetID="3" presetClass="emph" presetSubtype="2" fill="hold" nodeType="clickEffect">
+                                <p:cTn id="65" presetID="1" presetClass="entr" presetSubtype="0" fill="hold" nodeType="clickEffect">
+                                  <p:stCondLst>
+                                    <p:cond delay="0"/>
+                                  </p:stCondLst>
+                                  <p:childTnLst>
+                                    <p:set>
+                                      <p:cBhvr>
+                                        <p:cTn id="66" dur="1" fill="hold">
+                                          <p:stCondLst>
+                                            <p:cond delay="0"/>
+                                          </p:stCondLst>
+                                        </p:cTn>
+                                        <p:tgtEl>
+                                          <p:spTgt spid="3">
+                                            <p:txEl>
+                                              <p:pRg st="12" end="12"/>
+                                            </p:txEl>
+                                          </p:spTgt>
+                                        </p:tgtEl>
+                                        <p:attrNameLst>
+                                          <p:attrName>style.visibility</p:attrName>
+                                        </p:attrNameLst>
+                                      </p:cBhvr>
+                                      <p:to>
+                                        <p:strVal val="visible"/>
+                                      </p:to>
+                                    </p:set>
+                                  </p:childTnLst>
+                                </p:cTn>
+                              </p:par>
+                            </p:childTnLst>
+                          </p:cTn>
+                        </p:par>
+                      </p:childTnLst>
+                    </p:cTn>
+                  </p:par>
+                  <p:par>
+                    <p:cTn id="67" fill="hold">
+                      <p:stCondLst>
+                        <p:cond delay="indefinite"/>
+                      </p:stCondLst>
+                      <p:childTnLst>
+                        <p:par>
+                          <p:cTn id="68" fill="hold">
+                            <p:stCondLst>
+                              <p:cond delay="0"/>
+                            </p:stCondLst>
+                            <p:childTnLst>
+                              <p:par>
+                                <p:cTn id="69" presetID="3" presetClass="emph" presetSubtype="2" fill="hold" nodeType="clickEffect">
                                   <p:stCondLst>
                                     <p:cond delay="0"/>
                                   </p:stCondLst>
                                   <p:childTnLst>
                                     <p:animClr clrSpc="rgb" dir="cw">
                                       <p:cBhvr override="childStyle">
-                                        <p:cTn id="66" dur="100" fill="hold"/>
+                                        <p:cTn id="70" dur="100" fill="hold"/>
                                         <p:tgtEl>
                                           <p:spTgt spid="3">
                                             <p:txEl>
-                                              <p:pRg st="11" end="11"/>
+                                              <p:pRg st="12" end="12"/>
                                             </p:txEl>
                                           </p:spTgt>
                                         </p:tgtEl>

</xml_diff>